<commit_message>
last edits before game time
</commit_message>
<xml_diff>
--- a/Documents/School/Thesis docs/ALAT.pptx
+++ b/Documents/School/Thesis docs/ALAT.pptx
@@ -277,7 +277,7 @@
             <a:fld id="{3782A233-DA86-4D22-A406-9137F2216474}" type="datetimeFigureOut">
               <a:rPr lang="nl-NL" altLang="en-US"/>
               <a:pPr/>
-              <a:t>18-1-2016</a:t>
+              <a:t>21-1-2016</a:t>
             </a:fld>
             <a:endParaRPr lang="nl-NL" altLang="en-US"/>
           </a:p>
@@ -480,7 +480,7 @@
             <a:fld id="{43CBADFD-BBA0-45DF-89BE-E3AA6C4EA091}" type="datetimeFigureOut">
               <a:rPr lang="nl-NL" altLang="en-US"/>
               <a:pPr/>
-              <a:t>18-1-2016</a:t>
+              <a:t>21-1-2016</a:t>
             </a:fld>
             <a:endParaRPr lang="nl-NL" altLang="en-US"/>
           </a:p>
@@ -1213,15 +1213,7 @@
             </a:pPr>
             <a:r>
               <a:rPr lang="en-US" baseline="0" dirty="0" smtClean="0"/>
-              <a:t>selection </a:t>
-            </a:r>
-            <a:r>
-              <a:rPr lang="en-US" baseline="0" dirty="0" smtClean="0"/>
-              <a:t>boxes when adding relations contain </a:t>
-            </a:r>
-            <a:r>
-              <a:rPr lang="en-US" baseline="0" dirty="0" smtClean="0"/>
-              <a:t>huge lists.</a:t>
+              <a:t>selection boxes when adding relations contain huge lists.</a:t>
             </a:r>
             <a:endParaRPr lang="en-US" dirty="0"/>
           </a:p>
@@ -2278,27 +2270,17 @@
               <a:rPr lang="en-US" baseline="0" dirty="0" smtClean="0"/>
               <a:t> new concepts standard behavior: Rules and attributes. </a:t>
             </a:r>
-            <a:endParaRPr lang="en-US" baseline="0" dirty="0" smtClean="0"/>
           </a:p>
           <a:p>
             <a:r>
               <a:rPr lang="en-US" baseline="0" dirty="0" smtClean="0"/>
-              <a:t>ALSO </a:t>
-            </a:r>
+              <a:t>ALSO defines attributes over all concept types (used for layouts in GALE.) </a:t>
+            </a:r>
+          </a:p>
+          <a:p>
             <a:r>
               <a:rPr lang="en-US" baseline="0" dirty="0" smtClean="0"/>
-              <a:t>defines attributes over all concept types (used for layouts in GALE.) </a:t>
-            </a:r>
-            <a:endParaRPr lang="en-US" baseline="0" dirty="0" smtClean="0"/>
-          </a:p>
-          <a:p>
-            <a:r>
-              <a:rPr lang="en-US" baseline="0" dirty="0" smtClean="0"/>
-              <a:t>prevents </a:t>
-            </a:r>
-            <a:r>
-              <a:rPr lang="en-US" baseline="0" dirty="0" smtClean="0"/>
-              <a:t>having to declare them for every concept.</a:t>
+              <a:t>prevents having to declare them for every concept.</a:t>
             </a:r>
           </a:p>
         </p:txBody>
@@ -2497,6 +2479,12 @@
           <a:p>
             <a:r>
               <a:rPr lang="en-US" dirty="0" smtClean="0"/>
+              <a:t>Relation definitions template</a:t>
+            </a:r>
+          </a:p>
+          <a:p>
+            <a:r>
+              <a:rPr lang="en-US" dirty="0" smtClean="0"/>
               <a:t>Def rules Volatile -&gt; code calculated value</a:t>
             </a:r>
             <a:r>
@@ -2511,13 +2499,8 @@
             </a:r>
             <a:r>
               <a:rPr lang="en-US" baseline="0" dirty="0" smtClean="0"/>
-              <a:t> rules persistent -&gt; Only attribute updates are calculated (attribute stored in user profile automatically by GALE</a:t>
-            </a:r>
-            <a:r>
-              <a:rPr lang="en-US" baseline="0" dirty="0" smtClean="0"/>
-              <a:t>)</a:t>
-            </a:r>
-            <a:endParaRPr lang="en-US" baseline="0" dirty="0" smtClean="0"/>
+              <a:t> rules persistent -&gt; Only attribute updates are calculated (attribute stored in user profile automatically by GALE)</a:t>
+            </a:r>
           </a:p>
         </p:txBody>
       </p:sp>
@@ -2652,7 +2635,6 @@
               <a:rPr lang="en-US" baseline="0" dirty="0" smtClean="0"/>
               <a:t>DM + AM in 1 tool.</a:t>
             </a:r>
-            <a:endParaRPr lang="en-US" baseline="0" dirty="0" smtClean="0"/>
           </a:p>
         </p:txBody>
       </p:sp>
@@ -2841,6 +2823,111 @@
 </p:notes>
 </file>
 
+<file path=ppt/notesSlides/notesSlide25.xml><?xml version="1.0" encoding="utf-8"?>
+<p:notes xmlns:a="http://schemas.openxmlformats.org/drawingml/2006/main" xmlns:r="http://schemas.openxmlformats.org/officeDocument/2006/relationships" xmlns:p="http://schemas.openxmlformats.org/presentationml/2006/main">
+  <p:cSld>
+    <p:spTree>
+      <p:nvGrpSpPr>
+        <p:cNvPr id="1" name=""/>
+        <p:cNvGrpSpPr/>
+        <p:nvPr/>
+      </p:nvGrpSpPr>
+      <p:grpSpPr>
+        <a:xfrm>
+          <a:off x="0" y="0"/>
+          <a:ext cx="0" cy="0"/>
+          <a:chOff x="0" y="0"/>
+          <a:chExt cx="0" cy="0"/>
+        </a:xfrm>
+      </p:grpSpPr>
+      <p:sp>
+        <p:nvSpPr>
+          <p:cNvPr id="2" name="Slide Image Placeholder 1"/>
+          <p:cNvSpPr>
+            <a:spLocks noGrp="1" noRot="1" noChangeAspect="1"/>
+          </p:cNvSpPr>
+          <p:nvPr>
+            <p:ph type="sldImg"/>
+          </p:nvPr>
+        </p:nvSpPr>
+        <p:spPr/>
+      </p:sp>
+      <p:sp>
+        <p:nvSpPr>
+          <p:cNvPr id="3" name="Notes Placeholder 2"/>
+          <p:cNvSpPr>
+            <a:spLocks noGrp="1"/>
+          </p:cNvSpPr>
+          <p:nvPr>
+            <p:ph type="body" idx="1"/>
+          </p:nvPr>
+        </p:nvSpPr>
+        <p:spPr/>
+        <p:txBody>
+          <a:bodyPr/>
+          <a:lstStyle/>
+          <a:p>
+            <a:r>
+              <a:rPr lang="en-US" dirty="0" smtClean="0"/>
+              <a:t>I hope ALAT will become</a:t>
+            </a:r>
+            <a:r>
+              <a:rPr lang="en-US" baseline="0" dirty="0" smtClean="0"/>
+              <a:t> an authoring platform with both real-world as well as academic applications. I also hope it will set a new standard for authoring in GALE and that it will bring many opportunities </a:t>
+            </a:r>
+            <a:r>
+              <a:rPr lang="en-US" baseline="0" smtClean="0"/>
+              <a:t>for future </a:t>
+            </a:r>
+            <a:r>
+              <a:rPr lang="en-US" baseline="0" dirty="0" smtClean="0"/>
+              <a:t>research and development in </a:t>
+            </a:r>
+            <a:r>
+              <a:rPr lang="en-US" baseline="0" smtClean="0"/>
+              <a:t>the field of AH and GALE.</a:t>
+            </a:r>
+            <a:endParaRPr lang="en-US" dirty="0"/>
+          </a:p>
+        </p:txBody>
+      </p:sp>
+      <p:sp>
+        <p:nvSpPr>
+          <p:cNvPr id="4" name="Slide Number Placeholder 3"/>
+          <p:cNvSpPr>
+            <a:spLocks noGrp="1"/>
+          </p:cNvSpPr>
+          <p:nvPr>
+            <p:ph type="sldNum" sz="quarter" idx="10"/>
+          </p:nvPr>
+        </p:nvSpPr>
+        <p:spPr/>
+        <p:txBody>
+          <a:bodyPr/>
+          <a:lstStyle/>
+          <a:p>
+            <a:fld id="{BA38712C-9AF5-4848-9673-7EF0823A4FB2}" type="slidenum">
+              <a:rPr lang="nl-NL" altLang="en-US" smtClean="0"/>
+              <a:pPr/>
+              <a:t>27</a:t>
+            </a:fld>
+            <a:endParaRPr lang="nl-NL" altLang="en-US"/>
+          </a:p>
+        </p:txBody>
+      </p:sp>
+    </p:spTree>
+    <p:extLst>
+      <p:ext uri="{BB962C8B-B14F-4D97-AF65-F5344CB8AC3E}">
+        <p14:creationId xmlns:p14="http://schemas.microsoft.com/office/powerpoint/2010/main" val="2917647730"/>
+      </p:ext>
+    </p:extLst>
+  </p:cSld>
+  <p:clrMapOvr>
+    <a:masterClrMapping/>
+  </p:clrMapOvr>
+</p:notes>
+</file>
+
 <file path=ppt/notesSlides/notesSlide3.xml><?xml version="1.0" encoding="utf-8"?>
 <p:notes xmlns:a="http://schemas.openxmlformats.org/drawingml/2006/main" xmlns:r="http://schemas.openxmlformats.org/officeDocument/2006/relationships" xmlns:p="http://schemas.openxmlformats.org/presentationml/2006/main">
   <p:cSld>
@@ -3097,11 +3184,7 @@
             </a:r>
             <a:r>
               <a:rPr lang="en-US" baseline="0" dirty="0" smtClean="0"/>
-              <a:t> system </a:t>
-            </a:r>
-            <a:r>
-              <a:rPr lang="en-US" baseline="0" dirty="0" smtClean="0"/>
-              <a:t>itself (like </a:t>
+              <a:t> system itself (like </a:t>
             </a:r>
             <a:r>
               <a:rPr lang="en-US" baseline="0" dirty="0" err="1" smtClean="0"/>
@@ -3123,19 +3206,7 @@
           <a:p>
             <a:r>
               <a:rPr lang="en-US" baseline="0" dirty="0" smtClean="0"/>
-              <a:t>Or </a:t>
-            </a:r>
-            <a:r>
-              <a:rPr lang="en-US" baseline="0" dirty="0" smtClean="0"/>
-              <a:t>externally from some other </a:t>
-            </a:r>
-            <a:r>
-              <a:rPr lang="en-US" baseline="0" dirty="0" smtClean="0"/>
-              <a:t>available data </a:t>
-            </a:r>
-            <a:r>
-              <a:rPr lang="en-US" baseline="0" dirty="0" smtClean="0"/>
-              <a:t>source</a:t>
+              <a:t>Or externally from some other available data source</a:t>
             </a:r>
             <a:endParaRPr lang="en-US" dirty="0"/>
           </a:p>
@@ -3500,13 +3571,8 @@
           <a:p>
             <a:r>
               <a:rPr lang="en-US" baseline="0" dirty="0" smtClean="0"/>
-              <a:t>Tedious: Lot of repeated behavior. This results in a lot of dumb </a:t>
-            </a:r>
-            <a:r>
-              <a:rPr lang="en-US" baseline="0" dirty="0" smtClean="0"/>
-              <a:t>labor.</a:t>
-            </a:r>
-            <a:endParaRPr lang="en-US" baseline="0" dirty="0" smtClean="0"/>
+              <a:t>Tedious: Lot of repeated behavior. This results in a lot of dumb labor.</a:t>
+            </a:r>
           </a:p>
           <a:p>
             <a:endParaRPr lang="en-US" dirty="0"/>
@@ -8366,11 +8432,7 @@
           <a:p>
             <a:r>
               <a:rPr lang="en-US" dirty="0" smtClean="0"/>
-              <a:t>GRAPPLE Authoring </a:t>
-            </a:r>
-            <a:r>
-              <a:rPr lang="en-US" dirty="0" smtClean="0"/>
-              <a:t>Tool</a:t>
+              <a:t>GRAPPLE Authoring Tool</a:t>
             </a:r>
           </a:p>
           <a:p>
@@ -8378,7 +8440,6 @@
               <a:rPr lang="en-US" dirty="0" smtClean="0"/>
               <a:t>Also developed during GRAPPLE project</a:t>
             </a:r>
-            <a:endParaRPr lang="en-US" dirty="0" smtClean="0"/>
           </a:p>
           <a:p>
             <a:r>
@@ -9174,11 +9235,7 @@
             </a:pPr>
             <a:r>
               <a:rPr lang="en-US" sz="2800" b="1" dirty="0" smtClean="0"/>
-              <a:t>Other </a:t>
-            </a:r>
-            <a:r>
-              <a:rPr lang="en-US" sz="2800" b="1" dirty="0" smtClean="0"/>
-              <a:t>related work</a:t>
+              <a:t>Other related work</a:t>
             </a:r>
             <a:endParaRPr lang="en-US" sz="2800" b="1" dirty="0"/>
           </a:p>
@@ -10160,7 +10217,6 @@
               <a:rPr lang="en-US" dirty="0" smtClean="0"/>
               <a:t>Relation definitions</a:t>
             </a:r>
-            <a:endParaRPr lang="en-US" dirty="0" smtClean="0"/>
           </a:p>
           <a:p>
             <a:r>
@@ -14167,11 +14223,7 @@
           <a:p>
             <a:r>
               <a:rPr lang="en-US" dirty="0" smtClean="0"/>
-              <a:t>More Showcase </a:t>
-            </a:r>
-            <a:r>
-              <a:rPr lang="en-US" dirty="0" smtClean="0"/>
-              <a:t>applications</a:t>
+              <a:t>More Showcase applications</a:t>
             </a:r>
           </a:p>
           <a:p>
@@ -14287,6 +14339,13 @@
   <p:clrMapOvr>
     <a:masterClrMapping/>
   </p:clrMapOvr>
+  <p:timing>
+    <p:tnLst>
+      <p:par>
+        <p:cTn id="1" dur="indefinite" restart="never" nodeType="tmRoot"/>
+      </p:par>
+    </p:tnLst>
+  </p:timing>
 </p:sld>
 </file>
 
@@ -14437,6 +14496,13 @@
   <p:clrMapOvr>
     <a:masterClrMapping/>
   </p:clrMapOvr>
+  <p:timing>
+    <p:tnLst>
+      <p:par>
+        <p:cTn id="1" dur="indefinite" restart="never" nodeType="tmRoot"/>
+      </p:par>
+    </p:tnLst>
+  </p:timing>
 </p:sld>
 </file>
 
@@ -14549,6 +14615,13 @@
   <p:clrMapOvr>
     <a:masterClrMapping/>
   </p:clrMapOvr>
+  <p:timing>
+    <p:tnLst>
+      <p:par>
+        <p:cTn id="1" dur="indefinite" restart="never" nodeType="tmRoot"/>
+      </p:par>
+    </p:tnLst>
+  </p:timing>
 </p:sld>
 </file>
 
@@ -15109,7 +15182,6 @@
               <a:rPr lang="en-US" dirty="0" smtClean="0"/>
               <a:t>Questionnaires</a:t>
             </a:r>
-            <a:endParaRPr lang="en-US" dirty="0" smtClean="0"/>
           </a:p>
           <a:p>
             <a:pPr lvl="1"/>
@@ -15210,6 +15282,13 @@
   <p:clrMapOvr>
     <a:masterClrMapping/>
   </p:clrMapOvr>
+  <p:timing>
+    <p:tnLst>
+      <p:par>
+        <p:cTn id="1" dur="indefinite" restart="never" nodeType="tmRoot"/>
+      </p:par>
+    </p:tnLst>
+  </p:timing>
 </p:sld>
 </file>
 
@@ -15427,11 +15506,7 @@
           <a:p>
             <a:r>
               <a:rPr lang="en-US" dirty="0" smtClean="0"/>
-              <a:t>GALE (Generic Adaptation Language &amp; Engine</a:t>
-            </a:r>
-            <a:r>
-              <a:rPr lang="en-US" dirty="0" smtClean="0"/>
-              <a:t>)</a:t>
+              <a:t>GALE (Generic Adaptation Language &amp; Engine)</a:t>
             </a:r>
           </a:p>
           <a:p>
@@ -15439,7 +15514,6 @@
               <a:rPr lang="en-US" dirty="0" smtClean="0"/>
               <a:t>GRAPPLE project</a:t>
             </a:r>
-            <a:endParaRPr lang="en-US" dirty="0" smtClean="0"/>
           </a:p>
           <a:p>
             <a:r>

</xml_diff>